<commit_message>
upload documentation and presentation
</commit_message>
<xml_diff>
--- a/Documentation/presentación/NIB 0.1.1 - PRESENTATION .pptx
+++ b/Documentation/presentación/NIB 0.1.1 - PRESENTATION .pptx
@@ -266,7 +266,7 @@
           <a:p>
             <a:fld id="{A85D2281-AA29-46D9-A421-09837C2C5DD9}" type="datetimeFigureOut">
               <a:rPr lang="es-ES" smtClean="0"/>
-              <a:t>12/06/2023</a:t>
+              <a:t>18/06/2023</a:t>
             </a:fld>
             <a:endParaRPr lang="es-ES"/>
           </a:p>
@@ -764,7 +764,7 @@
           <a:p>
             <a:fld id="{1AF766CD-E6DD-4F8D-AB14-05E04FC98530}" type="datetimeFigureOut">
               <a:rPr lang="es-ES" smtClean="0"/>
-              <a:t>12/06/2023</a:t>
+              <a:t>18/06/2023</a:t>
             </a:fld>
             <a:endParaRPr lang="es-ES"/>
           </a:p>
@@ -962,7 +962,7 @@
           <a:p>
             <a:fld id="{1AF766CD-E6DD-4F8D-AB14-05E04FC98530}" type="datetimeFigureOut">
               <a:rPr lang="es-ES" smtClean="0"/>
-              <a:t>12/06/2023</a:t>
+              <a:t>18/06/2023</a:t>
             </a:fld>
             <a:endParaRPr lang="es-ES"/>
           </a:p>
@@ -1170,7 +1170,7 @@
           <a:p>
             <a:fld id="{1AF766CD-E6DD-4F8D-AB14-05E04FC98530}" type="datetimeFigureOut">
               <a:rPr lang="es-ES" smtClean="0"/>
-              <a:t>12/06/2023</a:t>
+              <a:t>18/06/2023</a:t>
             </a:fld>
             <a:endParaRPr lang="es-ES"/>
           </a:p>
@@ -1368,7 +1368,7 @@
           <a:p>
             <a:fld id="{1AF766CD-E6DD-4F8D-AB14-05E04FC98530}" type="datetimeFigureOut">
               <a:rPr lang="es-ES" smtClean="0"/>
-              <a:t>12/06/2023</a:t>
+              <a:t>18/06/2023</a:t>
             </a:fld>
             <a:endParaRPr lang="es-ES"/>
           </a:p>
@@ -1643,7 +1643,7 @@
           <a:p>
             <a:fld id="{1AF766CD-E6DD-4F8D-AB14-05E04FC98530}" type="datetimeFigureOut">
               <a:rPr lang="es-ES" smtClean="0"/>
-              <a:t>12/06/2023</a:t>
+              <a:t>18/06/2023</a:t>
             </a:fld>
             <a:endParaRPr lang="es-ES"/>
           </a:p>
@@ -1908,7 +1908,7 @@
           <a:p>
             <a:fld id="{1AF766CD-E6DD-4F8D-AB14-05E04FC98530}" type="datetimeFigureOut">
               <a:rPr lang="es-ES" smtClean="0"/>
-              <a:t>12/06/2023</a:t>
+              <a:t>18/06/2023</a:t>
             </a:fld>
             <a:endParaRPr lang="es-ES"/>
           </a:p>
@@ -2320,7 +2320,7 @@
           <a:p>
             <a:fld id="{1AF766CD-E6DD-4F8D-AB14-05E04FC98530}" type="datetimeFigureOut">
               <a:rPr lang="es-ES" smtClean="0"/>
-              <a:t>12/06/2023</a:t>
+              <a:t>18/06/2023</a:t>
             </a:fld>
             <a:endParaRPr lang="es-ES"/>
           </a:p>
@@ -2461,7 +2461,7 @@
           <a:p>
             <a:fld id="{1AF766CD-E6DD-4F8D-AB14-05E04FC98530}" type="datetimeFigureOut">
               <a:rPr lang="es-ES" smtClean="0"/>
-              <a:t>12/06/2023</a:t>
+              <a:t>18/06/2023</a:t>
             </a:fld>
             <a:endParaRPr lang="es-ES"/>
           </a:p>
@@ -2574,7 +2574,7 @@
           <a:p>
             <a:fld id="{1AF766CD-E6DD-4F8D-AB14-05E04FC98530}" type="datetimeFigureOut">
               <a:rPr lang="es-ES" smtClean="0"/>
-              <a:t>12/06/2023</a:t>
+              <a:t>18/06/2023</a:t>
             </a:fld>
             <a:endParaRPr lang="es-ES"/>
           </a:p>
@@ -2885,7 +2885,7 @@
           <a:p>
             <a:fld id="{1AF766CD-E6DD-4F8D-AB14-05E04FC98530}" type="datetimeFigureOut">
               <a:rPr lang="es-ES" smtClean="0"/>
-              <a:t>12/06/2023</a:t>
+              <a:t>18/06/2023</a:t>
             </a:fld>
             <a:endParaRPr lang="es-ES"/>
           </a:p>
@@ -3173,7 +3173,7 @@
           <a:p>
             <a:fld id="{1AF766CD-E6DD-4F8D-AB14-05E04FC98530}" type="datetimeFigureOut">
               <a:rPr lang="es-ES" smtClean="0"/>
-              <a:t>12/06/2023</a:t>
+              <a:t>18/06/2023</a:t>
             </a:fld>
             <a:endParaRPr lang="es-ES"/>
           </a:p>
@@ -3414,7 +3414,7 @@
           <a:p>
             <a:fld id="{1AF766CD-E6DD-4F8D-AB14-05E04FC98530}" type="datetimeFigureOut">
               <a:rPr lang="es-ES" smtClean="0"/>
-              <a:t>12/06/2023</a:t>
+              <a:t>18/06/2023</a:t>
             </a:fld>
             <a:endParaRPr lang="es-ES"/>
           </a:p>
@@ -13519,18 +13519,205 @@
         </p:nvSpPr>
         <p:spPr>
           <a:xfrm>
-            <a:off x="838200" y="2444261"/>
+            <a:off x="838200" y="2359865"/>
             <a:ext cx="10515600" cy="3732701"/>
           </a:xfrm>
         </p:spPr>
         <p:txBody>
-          <a:bodyPr/>
+          <a:bodyPr>
+            <a:normAutofit lnSpcReduction="10000"/>
+          </a:bodyPr>
           <a:lstStyle/>
           <a:p>
-            <a:endParaRPr lang="es-ES" dirty="0"/>
+            <a:r>
+              <a:rPr lang="es-ES" dirty="0">
+                <a:solidFill>
+                  <a:schemeClr val="accent1">
+                    <a:lumMod val="75000"/>
+                  </a:schemeClr>
+                </a:solidFill>
+                <a:effectLst>
+                  <a:outerShdw blurRad="38100" dist="38100" dir="2700000" algn="tl">
+                    <a:srgbClr val="000000">
+                      <a:alpha val="43137"/>
+                    </a:srgbClr>
+                  </a:outerShdw>
+                </a:effectLst>
+              </a:rPr>
+              <a:t>¿Qué es?</a:t>
+            </a:r>
+          </a:p>
+          <a:p>
+            <a:r>
+              <a:rPr lang="es-ES" dirty="0">
+                <a:solidFill>
+                  <a:schemeClr val="accent1">
+                    <a:lumMod val="75000"/>
+                  </a:schemeClr>
+                </a:solidFill>
+                <a:effectLst>
+                  <a:outerShdw blurRad="38100" dist="38100" dir="2700000" algn="tl">
+                    <a:srgbClr val="000000">
+                      <a:alpha val="43137"/>
+                    </a:srgbClr>
+                  </a:outerShdw>
+                </a:effectLst>
+              </a:rPr>
+              <a:t>NIB</a:t>
+            </a:r>
+          </a:p>
+          <a:p>
+            <a:r>
+              <a:rPr lang="es-ES" dirty="0">
+                <a:solidFill>
+                  <a:schemeClr val="accent1">
+                    <a:lumMod val="75000"/>
+                  </a:schemeClr>
+                </a:solidFill>
+                <a:effectLst>
+                  <a:outerShdw blurRad="38100" dist="38100" dir="2700000" algn="tl">
+                    <a:srgbClr val="000000">
+                      <a:alpha val="43137"/>
+                    </a:srgbClr>
+                  </a:outerShdw>
+                </a:effectLst>
+              </a:rPr>
+              <a:t>Lanzadores</a:t>
+            </a:r>
+          </a:p>
+          <a:p>
+            <a:r>
+              <a:rPr lang="es-ES" dirty="0">
+                <a:solidFill>
+                  <a:schemeClr val="accent1">
+                    <a:lumMod val="75000"/>
+                  </a:schemeClr>
+                </a:solidFill>
+                <a:effectLst>
+                  <a:outerShdw blurRad="38100" dist="38100" dir="2700000" algn="tl">
+                    <a:srgbClr val="000000">
+                      <a:alpha val="43137"/>
+                    </a:srgbClr>
+                  </a:outerShdw>
+                </a:effectLst>
+              </a:rPr>
+              <a:t>Servidores</a:t>
+            </a:r>
+          </a:p>
+          <a:p>
+            <a:r>
+              <a:rPr lang="es-ES" dirty="0">
+                <a:solidFill>
+                  <a:schemeClr val="accent1">
+                    <a:lumMod val="75000"/>
+                  </a:schemeClr>
+                </a:solidFill>
+                <a:effectLst>
+                  <a:outerShdw blurRad="38100" dist="38100" dir="2700000" algn="tl">
+                    <a:srgbClr val="000000">
+                      <a:alpha val="43137"/>
+                    </a:srgbClr>
+                  </a:outerShdw>
+                </a:effectLst>
+              </a:rPr>
+              <a:t>Uso</a:t>
+            </a:r>
+          </a:p>
+          <a:p>
+            <a:r>
+              <a:rPr lang="es-ES" dirty="0">
+                <a:solidFill>
+                  <a:schemeClr val="accent1">
+                    <a:lumMod val="75000"/>
+                  </a:schemeClr>
+                </a:solidFill>
+                <a:effectLst>
+                  <a:outerShdw blurRad="38100" dist="38100" dir="2700000" algn="tl">
+                    <a:srgbClr val="000000">
+                      <a:alpha val="43137"/>
+                    </a:srgbClr>
+                  </a:outerShdw>
+                </a:effectLst>
+              </a:rPr>
+              <a:t>Mercado / Publico</a:t>
+            </a:r>
+          </a:p>
+          <a:p>
+            <a:r>
+              <a:rPr lang="es-ES" dirty="0">
+                <a:solidFill>
+                  <a:schemeClr val="accent1">
+                    <a:lumMod val="75000"/>
+                  </a:schemeClr>
+                </a:solidFill>
+                <a:effectLst>
+                  <a:outerShdw blurRad="38100" dist="38100" dir="2700000" algn="tl">
+                    <a:srgbClr val="000000">
+                      <a:alpha val="43137"/>
+                    </a:srgbClr>
+                  </a:outerShdw>
+                </a:effectLst>
+              </a:rPr>
+              <a:t>Mejoras Futuras</a:t>
+            </a:r>
+          </a:p>
+          <a:p>
+            <a:r>
+              <a:rPr lang="es-ES" dirty="0">
+                <a:solidFill>
+                  <a:schemeClr val="accent1">
+                    <a:lumMod val="75000"/>
+                  </a:schemeClr>
+                </a:solidFill>
+                <a:effectLst>
+                  <a:outerShdw blurRad="38100" dist="38100" dir="2700000" algn="tl">
+                    <a:srgbClr val="000000">
+                      <a:alpha val="43137"/>
+                    </a:srgbClr>
+                  </a:outerShdw>
+                </a:effectLst>
+              </a:rPr>
+              <a:t>Demostración</a:t>
+            </a:r>
           </a:p>
         </p:txBody>
       </p:sp>
+      <p:pic>
+        <p:nvPicPr>
+          <p:cNvPr id="8" name="Imagen 7">
+            <a:extLst>
+              <a:ext uri="{FF2B5EF4-FFF2-40B4-BE49-F238E27FC236}">
+                <a16:creationId xmlns:a16="http://schemas.microsoft.com/office/drawing/2014/main" id="{93CF2B74-F776-1528-1554-6F064CA05746}"/>
+              </a:ext>
+            </a:extLst>
+          </p:cNvPr>
+          <p:cNvPicPr>
+            <a:picLocks noChangeAspect="1"/>
+          </p:cNvPicPr>
+          <p:nvPr/>
+        </p:nvPicPr>
+        <p:blipFill>
+          <a:blip r:embed="rId3">
+            <a:extLst>
+              <a:ext uri="{28A0092B-C50C-407E-A947-70E740481C1C}">
+                <a14:useLocalDpi xmlns:a14="http://schemas.microsoft.com/office/drawing/2010/main" val="0"/>
+              </a:ext>
+            </a:extLst>
+          </a:blip>
+          <a:stretch>
+            <a:fillRect/>
+          </a:stretch>
+        </p:blipFill>
+        <p:spPr>
+          <a:xfrm>
+            <a:off x="6652846" y="2259821"/>
+            <a:ext cx="4700954" cy="3734403"/>
+          </a:xfrm>
+          <a:prstGeom prst="rect">
+            <a:avLst/>
+          </a:prstGeom>
+        </p:spPr>
+      </p:pic>
     </p:spTree>
     <p:extLst>
       <p:ext uri="{BB962C8B-B14F-4D97-AF65-F5344CB8AC3E}">
@@ -15186,6 +15373,45 @@
           </p:txBody>
         </p:sp>
       </p:grpSp>
+      <p:pic>
+        <p:nvPicPr>
+          <p:cNvPr id="3" name="Gráfico 2" descr="Caja">
+            <a:extLst>
+              <a:ext uri="{FF2B5EF4-FFF2-40B4-BE49-F238E27FC236}">
+                <a16:creationId xmlns:a16="http://schemas.microsoft.com/office/drawing/2014/main" id="{6F31E31E-FB13-802C-4702-DAB463A2EB48}"/>
+              </a:ext>
+            </a:extLst>
+          </p:cNvPr>
+          <p:cNvPicPr>
+            <a:picLocks noChangeAspect="1"/>
+          </p:cNvPicPr>
+          <p:nvPr/>
+        </p:nvPicPr>
+        <p:blipFill>
+          <a:blip r:embed="rId3">
+            <a:extLst>
+              <a:ext uri="{28A0092B-C50C-407E-A947-70E740481C1C}">
+                <a14:useLocalDpi xmlns:a14="http://schemas.microsoft.com/office/drawing/2010/main" val="0"/>
+              </a:ext>
+              <a:ext uri="{96DAC541-7B7A-43D3-8B79-37D633B846F1}">
+                <asvg:svgBlip xmlns:asvg="http://schemas.microsoft.com/office/drawing/2016/SVG/main" r:embed="rId4"/>
+              </a:ext>
+            </a:extLst>
+          </a:blip>
+          <a:stretch>
+            <a:fillRect/>
+          </a:stretch>
+        </p:blipFill>
+        <p:spPr>
+          <a:xfrm>
+            <a:off x="472439" y="2091903"/>
+            <a:ext cx="2583021" cy="2583021"/>
+          </a:xfrm>
+          <a:prstGeom prst="rect">
+            <a:avLst/>
+          </a:prstGeom>
+        </p:spPr>
+      </p:pic>
     </p:spTree>
     <p:extLst>
       <p:ext uri="{BB962C8B-B14F-4D97-AF65-F5344CB8AC3E}">
@@ -15299,6 +15525,90 @@
                                         </p:cTn>
                                         <p:tgtEl>
                                           <p:spTgt spid="4"/>
+                                        </p:tgtEl>
+                                        <p:attrNameLst>
+                                          <p:attrName>r</p:attrName>
+                                        </p:attrNameLst>
+                                      </p:cBhvr>
+                                    </p:animRot>
+                                  </p:childTnLst>
+                                </p:cTn>
+                              </p:par>
+                              <p:par>
+                                <p:cTn id="11" presetID="32" presetClass="emph" presetSubtype="0" fill="hold" nodeType="withEffect">
+                                  <p:stCondLst>
+                                    <p:cond delay="0"/>
+                                  </p:stCondLst>
+                                  <p:childTnLst>
+                                    <p:animRot by="120000">
+                                      <p:cBhvr>
+                                        <p:cTn id="12" dur="100" fill="hold">
+                                          <p:stCondLst>
+                                            <p:cond delay="0"/>
+                                          </p:stCondLst>
+                                        </p:cTn>
+                                        <p:tgtEl>
+                                          <p:spTgt spid="3"/>
+                                        </p:tgtEl>
+                                        <p:attrNameLst>
+                                          <p:attrName>r</p:attrName>
+                                        </p:attrNameLst>
+                                      </p:cBhvr>
+                                    </p:animRot>
+                                    <p:animRot by="-240000">
+                                      <p:cBhvr>
+                                        <p:cTn id="13" dur="200" fill="hold">
+                                          <p:stCondLst>
+                                            <p:cond delay="200"/>
+                                          </p:stCondLst>
+                                        </p:cTn>
+                                        <p:tgtEl>
+                                          <p:spTgt spid="3"/>
+                                        </p:tgtEl>
+                                        <p:attrNameLst>
+                                          <p:attrName>r</p:attrName>
+                                        </p:attrNameLst>
+                                      </p:cBhvr>
+                                    </p:animRot>
+                                    <p:animRot by="240000">
+                                      <p:cBhvr>
+                                        <p:cTn id="14" dur="200" fill="hold">
+                                          <p:stCondLst>
+                                            <p:cond delay="400"/>
+                                          </p:stCondLst>
+                                        </p:cTn>
+                                        <p:tgtEl>
+                                          <p:spTgt spid="3"/>
+                                        </p:tgtEl>
+                                        <p:attrNameLst>
+                                          <p:attrName>r</p:attrName>
+                                        </p:attrNameLst>
+                                      </p:cBhvr>
+                                    </p:animRot>
+                                    <p:animRot by="-240000">
+                                      <p:cBhvr>
+                                        <p:cTn id="15" dur="200" fill="hold">
+                                          <p:stCondLst>
+                                            <p:cond delay="600"/>
+                                          </p:stCondLst>
+                                        </p:cTn>
+                                        <p:tgtEl>
+                                          <p:spTgt spid="3"/>
+                                        </p:tgtEl>
+                                        <p:attrNameLst>
+                                          <p:attrName>r</p:attrName>
+                                        </p:attrNameLst>
+                                      </p:cBhvr>
+                                    </p:animRot>
+                                    <p:animRot by="120000">
+                                      <p:cBhvr>
+                                        <p:cTn id="16" dur="200" fill="hold">
+                                          <p:stCondLst>
+                                            <p:cond delay="800"/>
+                                          </p:stCondLst>
+                                        </p:cTn>
+                                        <p:tgtEl>
+                                          <p:spTgt spid="3"/>
                                         </p:tgtEl>
                                         <p:attrNameLst>
                                           <p:attrName>r</p:attrName>
@@ -17624,45 +17934,6 @@
       </p:sp>
       <p:pic>
         <p:nvPicPr>
-          <p:cNvPr id="10" name="Gráfico 9" descr="Megáfono">
-            <a:extLst>
-              <a:ext uri="{FF2B5EF4-FFF2-40B4-BE49-F238E27FC236}">
-                <a16:creationId xmlns:a16="http://schemas.microsoft.com/office/drawing/2014/main" id="{DA56C66A-83C1-8D7A-805A-B714E9A0C3B2}"/>
-              </a:ext>
-            </a:extLst>
-          </p:cNvPr>
-          <p:cNvPicPr>
-            <a:picLocks noChangeAspect="1"/>
-          </p:cNvPicPr>
-          <p:nvPr/>
-        </p:nvPicPr>
-        <p:blipFill>
-          <a:blip r:embed="rId4">
-            <a:extLst>
-              <a:ext uri="{28A0092B-C50C-407E-A947-70E740481C1C}">
-                <a14:useLocalDpi xmlns:a14="http://schemas.microsoft.com/office/drawing/2010/main" val="0"/>
-              </a:ext>
-              <a:ext uri="{96DAC541-7B7A-43D3-8B79-37D633B846F1}">
-                <asvg:svgBlip xmlns:asvg="http://schemas.microsoft.com/office/drawing/2016/SVG/main" r:embed="rId5"/>
-              </a:ext>
-            </a:extLst>
-          </a:blip>
-          <a:stretch>
-            <a:fillRect/>
-          </a:stretch>
-        </p:blipFill>
-        <p:spPr>
-          <a:xfrm>
-            <a:off x="7564314" y="3692769"/>
-            <a:ext cx="2620108" cy="2620108"/>
-          </a:xfrm>
-          <a:prstGeom prst="rect">
-            <a:avLst/>
-          </a:prstGeom>
-        </p:spPr>
-      </p:pic>
-      <p:pic>
-        <p:nvPicPr>
           <p:cNvPr id="2050" name="Picture 2" descr="Google Ads - Wikipedia, la enciclopedia libre">
             <a:extLst>
               <a:ext uri="{FF2B5EF4-FFF2-40B4-BE49-F238E27FC236}">
@@ -17676,7 +17947,7 @@
           <p:nvPr/>
         </p:nvPicPr>
         <p:blipFill>
-          <a:blip r:embed="rId6">
+          <a:blip r:embed="rId4">
             <a:extLst>
               <a:ext uri="{28A0092B-C50C-407E-A947-70E740481C1C}">
                 <a14:useLocalDpi xmlns:a14="http://schemas.microsoft.com/office/drawing/2010/main" val="0"/>
@@ -17708,6 +17979,187 @@
           </a:extLst>
         </p:spPr>
       </p:pic>
+      <p:pic>
+        <p:nvPicPr>
+          <p:cNvPr id="10" name="Gráfico 9" descr="Megáfono">
+            <a:extLst>
+              <a:ext uri="{FF2B5EF4-FFF2-40B4-BE49-F238E27FC236}">
+                <a16:creationId xmlns:a16="http://schemas.microsoft.com/office/drawing/2014/main" id="{DA56C66A-83C1-8D7A-805A-B714E9A0C3B2}"/>
+              </a:ext>
+            </a:extLst>
+          </p:cNvPr>
+          <p:cNvPicPr>
+            <a:picLocks noChangeAspect="1"/>
+          </p:cNvPicPr>
+          <p:nvPr/>
+        </p:nvPicPr>
+        <p:blipFill>
+          <a:blip r:embed="rId5">
+            <a:extLst>
+              <a:ext uri="{28A0092B-C50C-407E-A947-70E740481C1C}">
+                <a14:useLocalDpi xmlns:a14="http://schemas.microsoft.com/office/drawing/2010/main" val="0"/>
+              </a:ext>
+              <a:ext uri="{96DAC541-7B7A-43D3-8B79-37D633B846F1}">
+                <asvg:svgBlip xmlns:asvg="http://schemas.microsoft.com/office/drawing/2016/SVG/main" r:embed="rId6"/>
+              </a:ext>
+            </a:extLst>
+          </a:blip>
+          <a:stretch>
+            <a:fillRect/>
+          </a:stretch>
+        </p:blipFill>
+        <p:spPr>
+          <a:xfrm rot="21025621">
+            <a:off x="7224681" y="3219853"/>
+            <a:ext cx="2414274" cy="2414274"/>
+          </a:xfrm>
+          <a:prstGeom prst="rect">
+            <a:avLst/>
+          </a:prstGeom>
+        </p:spPr>
+      </p:pic>
+      <p:sp>
+        <p:nvSpPr>
+          <p:cNvPr id="2" name="Elipse 1">
+            <a:extLst>
+              <a:ext uri="{FF2B5EF4-FFF2-40B4-BE49-F238E27FC236}">
+                <a16:creationId xmlns:a16="http://schemas.microsoft.com/office/drawing/2014/main" id="{1206D920-3279-494E-CD39-C432C62D1C2D}"/>
+              </a:ext>
+            </a:extLst>
+          </p:cNvPr>
+          <p:cNvSpPr/>
+          <p:nvPr/>
+        </p:nvSpPr>
+        <p:spPr>
+          <a:xfrm rot="21025621">
+            <a:off x="5892570" y="4226647"/>
+            <a:ext cx="1487054" cy="1570827"/>
+          </a:xfrm>
+          <a:prstGeom prst="ellipse">
+            <a:avLst/>
+          </a:prstGeom>
+        </p:spPr>
+        <p:style>
+          <a:lnRef idx="2">
+            <a:schemeClr val="accent1">
+              <a:shade val="15000"/>
+            </a:schemeClr>
+          </a:lnRef>
+          <a:fillRef idx="1">
+            <a:schemeClr val="accent1"/>
+          </a:fillRef>
+          <a:effectRef idx="0">
+            <a:schemeClr val="accent1"/>
+          </a:effectRef>
+          <a:fontRef idx="minor">
+            <a:schemeClr val="lt1"/>
+          </a:fontRef>
+        </p:style>
+        <p:txBody>
+          <a:bodyPr rtlCol="0" anchor="ctr"/>
+          <a:lstStyle/>
+          <a:p>
+            <a:pPr algn="ctr"/>
+            <a:endParaRPr lang="es-ES"/>
+          </a:p>
+        </p:txBody>
+      </p:sp>
+      <p:sp>
+        <p:nvSpPr>
+          <p:cNvPr id="9" name="Rectángulo: esquinas redondeadas 8">
+            <a:extLst>
+              <a:ext uri="{FF2B5EF4-FFF2-40B4-BE49-F238E27FC236}">
+                <a16:creationId xmlns:a16="http://schemas.microsoft.com/office/drawing/2014/main" id="{CC928358-285A-8581-878C-2D303913E42E}"/>
+              </a:ext>
+            </a:extLst>
+          </p:cNvPr>
+          <p:cNvSpPr/>
+          <p:nvPr/>
+        </p:nvSpPr>
+        <p:spPr>
+          <a:xfrm rot="18258950">
+            <a:off x="7427107" y="5540636"/>
+            <a:ext cx="1605425" cy="600363"/>
+          </a:xfrm>
+          <a:prstGeom prst="roundRect">
+            <a:avLst>
+              <a:gd name="adj" fmla="val 50000"/>
+            </a:avLst>
+          </a:prstGeom>
+        </p:spPr>
+        <p:style>
+          <a:lnRef idx="2">
+            <a:schemeClr val="accent1">
+              <a:shade val="15000"/>
+            </a:schemeClr>
+          </a:lnRef>
+          <a:fillRef idx="1">
+            <a:schemeClr val="accent1"/>
+          </a:fillRef>
+          <a:effectRef idx="0">
+            <a:schemeClr val="accent1"/>
+          </a:effectRef>
+          <a:fontRef idx="minor">
+            <a:schemeClr val="lt1"/>
+          </a:fontRef>
+        </p:style>
+        <p:txBody>
+          <a:bodyPr rtlCol="0" anchor="ctr"/>
+          <a:lstStyle/>
+          <a:p>
+            <a:pPr algn="ctr"/>
+            <a:endParaRPr lang="es-ES"/>
+          </a:p>
+        </p:txBody>
+      </p:sp>
+      <p:sp>
+        <p:nvSpPr>
+          <p:cNvPr id="11" name="Rectángulo: esquinas redondeadas 10">
+            <a:extLst>
+              <a:ext uri="{FF2B5EF4-FFF2-40B4-BE49-F238E27FC236}">
+                <a16:creationId xmlns:a16="http://schemas.microsoft.com/office/drawing/2014/main" id="{7AD070A7-1621-2B0B-7ED4-3C647BFDCE64}"/>
+              </a:ext>
+            </a:extLst>
+          </p:cNvPr>
+          <p:cNvSpPr/>
+          <p:nvPr/>
+        </p:nvSpPr>
+        <p:spPr>
+          <a:xfrm rot="15625621">
+            <a:off x="5935802" y="6300627"/>
+            <a:ext cx="2055680" cy="1281027"/>
+          </a:xfrm>
+          <a:prstGeom prst="roundRect">
+            <a:avLst>
+              <a:gd name="adj" fmla="val 50000"/>
+            </a:avLst>
+          </a:prstGeom>
+        </p:spPr>
+        <p:style>
+          <a:lnRef idx="2">
+            <a:schemeClr val="accent1">
+              <a:shade val="15000"/>
+            </a:schemeClr>
+          </a:lnRef>
+          <a:fillRef idx="1">
+            <a:schemeClr val="accent1"/>
+          </a:fillRef>
+          <a:effectRef idx="0">
+            <a:schemeClr val="accent1"/>
+          </a:effectRef>
+          <a:fontRef idx="minor">
+            <a:schemeClr val="lt1"/>
+          </a:fontRef>
+        </p:style>
+        <p:txBody>
+          <a:bodyPr rtlCol="0" anchor="ctr"/>
+          <a:lstStyle/>
+          <a:p>
+            <a:pPr algn="ctr"/>
+            <a:endParaRPr lang="es-ES"/>
+          </a:p>
+        </p:txBody>
+      </p:sp>
     </p:spTree>
     <p:extLst>
       <p:ext uri="{BB962C8B-B14F-4D97-AF65-F5344CB8AC3E}">
@@ -17820,6 +18272,99 @@
                                         </p:cTn>
                                         <p:tgtEl>
                                           <p:spTgt spid="7"/>
+                                        </p:tgtEl>
+                                        <p:attrNameLst>
+                                          <p:attrName>r</p:attrName>
+                                        </p:attrNameLst>
+                                      </p:cBhvr>
+                                    </p:animRot>
+                                  </p:childTnLst>
+                                </p:cTn>
+                              </p:par>
+                            </p:childTnLst>
+                          </p:cTn>
+                        </p:par>
+                        <p:par>
+                          <p:cTn id="11" fill="hold">
+                            <p:stCondLst>
+                              <p:cond delay="800"/>
+                            </p:stCondLst>
+                            <p:childTnLst>
+                              <p:par>
+                                <p:cTn id="12" presetID="32" presetClass="emph" presetSubtype="0" fill="hold" nodeType="afterEffect">
+                                  <p:stCondLst>
+                                    <p:cond delay="0"/>
+                                  </p:stCondLst>
+                                  <p:childTnLst>
+                                    <p:animRot by="120000">
+                                      <p:cBhvr>
+                                        <p:cTn id="13" dur="100" fill="hold">
+                                          <p:stCondLst>
+                                            <p:cond delay="0"/>
+                                          </p:stCondLst>
+                                        </p:cTn>
+                                        <p:tgtEl>
+                                          <p:spTgt spid="10"/>
+                                        </p:tgtEl>
+                                        <p:attrNameLst>
+                                          <p:attrName>r</p:attrName>
+                                        </p:attrNameLst>
+                                      </p:cBhvr>
+                                    </p:animRot>
+                                    <p:animRot by="-240000">
+                                      <p:cBhvr>
+                                        <p:cTn id="14" dur="200" fill="hold">
+                                          <p:stCondLst>
+                                            <p:cond delay="200"/>
+                                          </p:stCondLst>
+                                        </p:cTn>
+                                        <p:tgtEl>
+                                          <p:spTgt spid="10"/>
+                                        </p:tgtEl>
+                                        <p:attrNameLst>
+                                          <p:attrName>r</p:attrName>
+                                        </p:attrNameLst>
+                                      </p:cBhvr>
+                                    </p:animRot>
+                                    <p:animRot by="240000">
+                                      <p:cBhvr>
+                                        <p:cTn id="15" dur="200" fill="hold">
+                                          <p:stCondLst>
+                                            <p:cond delay="400"/>
+                                          </p:stCondLst>
+                                        </p:cTn>
+                                        <p:tgtEl>
+                                          <p:spTgt spid="10"/>
+                                        </p:tgtEl>
+                                        <p:attrNameLst>
+                                          <p:attrName>r</p:attrName>
+                                        </p:attrNameLst>
+                                      </p:cBhvr>
+                                    </p:animRot>
+                                    <p:animRot by="-240000">
+                                      <p:cBhvr>
+                                        <p:cTn id="16" dur="200" fill="hold">
+                                          <p:stCondLst>
+                                            <p:cond delay="600"/>
+                                          </p:stCondLst>
+                                        </p:cTn>
+                                        <p:tgtEl>
+                                          <p:spTgt spid="10"/>
+                                        </p:tgtEl>
+                                        <p:attrNameLst>
+                                          <p:attrName>r</p:attrName>
+                                        </p:attrNameLst>
+                                      </p:cBhvr>
+                                    </p:animRot>
+                                    <p:animRot by="120000">
+                                      <p:cBhvr>
+                                        <p:cTn id="17" dur="200" fill="hold">
+                                          <p:stCondLst>
+                                            <p:cond delay="800"/>
+                                          </p:stCondLst>
+                                        </p:cTn>
+                                        <p:tgtEl>
+                                          <p:spTgt spid="10"/>
                                         </p:tgtEl>
                                         <p:attrNameLst>
                                           <p:attrName>r</p:attrName>
@@ -19852,6 +20397,340 @@
           </a:graphicData>
         </a:graphic>
       </p:graphicFrame>
+      <p:pic>
+        <p:nvPicPr>
+          <p:cNvPr id="7" name="Gráfico 6" descr="Insecto">
+            <a:extLst>
+              <a:ext uri="{FF2B5EF4-FFF2-40B4-BE49-F238E27FC236}">
+                <a16:creationId xmlns:a16="http://schemas.microsoft.com/office/drawing/2014/main" id="{719DD028-266A-8C72-B285-CFDF47256A5E}"/>
+              </a:ext>
+            </a:extLst>
+          </p:cNvPr>
+          <p:cNvPicPr>
+            <a:picLocks noChangeAspect="1"/>
+          </p:cNvPicPr>
+          <p:nvPr/>
+        </p:nvPicPr>
+        <p:blipFill>
+          <a:blip r:embed="rId3">
+            <a:extLst>
+              <a:ext uri="{28A0092B-C50C-407E-A947-70E740481C1C}">
+                <a14:useLocalDpi xmlns:a14="http://schemas.microsoft.com/office/drawing/2010/main" val="0"/>
+              </a:ext>
+              <a:ext uri="{96DAC541-7B7A-43D3-8B79-37D633B846F1}">
+                <asvg:svgBlip xmlns:asvg="http://schemas.microsoft.com/office/drawing/2016/SVG/main" r:embed="rId4"/>
+              </a:ext>
+            </a:extLst>
+          </a:blip>
+          <a:stretch>
+            <a:fillRect/>
+          </a:stretch>
+        </p:blipFill>
+        <p:spPr>
+          <a:xfrm rot="19527098">
+            <a:off x="4739640" y="7147560"/>
+            <a:ext cx="914400" cy="914400"/>
+          </a:xfrm>
+          <a:prstGeom prst="rect">
+            <a:avLst/>
+          </a:prstGeom>
+        </p:spPr>
+      </p:pic>
+      <p:pic>
+        <p:nvPicPr>
+          <p:cNvPr id="8" name="Gráfico 7" descr="Insecto">
+            <a:extLst>
+              <a:ext uri="{FF2B5EF4-FFF2-40B4-BE49-F238E27FC236}">
+                <a16:creationId xmlns:a16="http://schemas.microsoft.com/office/drawing/2014/main" id="{F60D7CD6-CC9E-241E-A973-24D31FD52EC3}"/>
+              </a:ext>
+            </a:extLst>
+          </p:cNvPr>
+          <p:cNvPicPr>
+            <a:picLocks noChangeAspect="1"/>
+          </p:cNvPicPr>
+          <p:nvPr/>
+        </p:nvPicPr>
+        <p:blipFill>
+          <a:blip r:embed="rId5">
+            <a:extLst>
+              <a:ext uri="{28A0092B-C50C-407E-A947-70E740481C1C}">
+                <a14:useLocalDpi xmlns:a14="http://schemas.microsoft.com/office/drawing/2010/main" val="0"/>
+              </a:ext>
+              <a:ext uri="{96DAC541-7B7A-43D3-8B79-37D633B846F1}">
+                <asvg:svgBlip xmlns:asvg="http://schemas.microsoft.com/office/drawing/2016/SVG/main" r:embed="rId6"/>
+              </a:ext>
+            </a:extLst>
+          </a:blip>
+          <a:stretch>
+            <a:fillRect/>
+          </a:stretch>
+        </p:blipFill>
+        <p:spPr>
+          <a:xfrm rot="1996762">
+            <a:off x="-2941319" y="3192775"/>
+            <a:ext cx="914400" cy="914400"/>
+          </a:xfrm>
+          <a:prstGeom prst="rect">
+            <a:avLst/>
+          </a:prstGeom>
+        </p:spPr>
+      </p:pic>
+      <p:pic>
+        <p:nvPicPr>
+          <p:cNvPr id="9" name="Gráfico 8" descr="Insecto">
+            <a:extLst>
+              <a:ext uri="{FF2B5EF4-FFF2-40B4-BE49-F238E27FC236}">
+                <a16:creationId xmlns:a16="http://schemas.microsoft.com/office/drawing/2014/main" id="{7952D008-9363-9133-B321-133E5739E390}"/>
+              </a:ext>
+            </a:extLst>
+          </p:cNvPr>
+          <p:cNvPicPr>
+            <a:picLocks noChangeAspect="1"/>
+          </p:cNvPicPr>
+          <p:nvPr/>
+        </p:nvPicPr>
+        <p:blipFill>
+          <a:blip r:embed="rId7">
+            <a:extLst>
+              <a:ext uri="{28A0092B-C50C-407E-A947-70E740481C1C}">
+                <a14:useLocalDpi xmlns:a14="http://schemas.microsoft.com/office/drawing/2010/main" val="0"/>
+              </a:ext>
+              <a:ext uri="{96DAC541-7B7A-43D3-8B79-37D633B846F1}">
+                <asvg:svgBlip xmlns:asvg="http://schemas.microsoft.com/office/drawing/2016/SVG/main" r:embed="rId8"/>
+              </a:ext>
+            </a:extLst>
+          </a:blip>
+          <a:stretch>
+            <a:fillRect/>
+          </a:stretch>
+        </p:blipFill>
+        <p:spPr>
+          <a:xfrm rot="7484248">
+            <a:off x="9136238" y="-1526096"/>
+            <a:ext cx="914400" cy="914400"/>
+          </a:xfrm>
+          <a:prstGeom prst="rect">
+            <a:avLst/>
+          </a:prstGeom>
+        </p:spPr>
+      </p:pic>
+      <p:pic>
+        <p:nvPicPr>
+          <p:cNvPr id="10" name="Gráfico 9" descr="Insecto">
+            <a:extLst>
+              <a:ext uri="{FF2B5EF4-FFF2-40B4-BE49-F238E27FC236}">
+                <a16:creationId xmlns:a16="http://schemas.microsoft.com/office/drawing/2014/main" id="{450D7F8C-D6E8-2D4E-916C-6FD5B26D597A}"/>
+              </a:ext>
+            </a:extLst>
+          </p:cNvPr>
+          <p:cNvPicPr>
+            <a:picLocks noChangeAspect="1"/>
+          </p:cNvPicPr>
+          <p:nvPr/>
+        </p:nvPicPr>
+        <p:blipFill>
+          <a:blip r:embed="rId9">
+            <a:extLst>
+              <a:ext uri="{28A0092B-C50C-407E-A947-70E740481C1C}">
+                <a14:useLocalDpi xmlns:a14="http://schemas.microsoft.com/office/drawing/2010/main" val="0"/>
+              </a:ext>
+              <a:ext uri="{96DAC541-7B7A-43D3-8B79-37D633B846F1}">
+                <asvg:svgBlip xmlns:asvg="http://schemas.microsoft.com/office/drawing/2016/SVG/main" r:embed="rId10"/>
+              </a:ext>
+            </a:extLst>
+          </a:blip>
+          <a:stretch>
+            <a:fillRect/>
+          </a:stretch>
+        </p:blipFill>
+        <p:spPr>
+          <a:xfrm rot="13320949">
+            <a:off x="13190078" y="861905"/>
+            <a:ext cx="914400" cy="914400"/>
+          </a:xfrm>
+          <a:prstGeom prst="rect">
+            <a:avLst/>
+          </a:prstGeom>
+        </p:spPr>
+      </p:pic>
+      <p:sp>
+        <p:nvSpPr>
+          <p:cNvPr id="11" name="Flecha: hacia abajo 10">
+            <a:extLst>
+              <a:ext uri="{FF2B5EF4-FFF2-40B4-BE49-F238E27FC236}">
+                <a16:creationId xmlns:a16="http://schemas.microsoft.com/office/drawing/2014/main" id="{9BAB3118-F06F-C8A7-828B-DA846629C147}"/>
+              </a:ext>
+            </a:extLst>
+          </p:cNvPr>
+          <p:cNvSpPr/>
+          <p:nvPr/>
+        </p:nvSpPr>
+        <p:spPr>
+          <a:xfrm>
+            <a:off x="441960" y="-1851048"/>
+            <a:ext cx="975360" cy="1418387"/>
+          </a:xfrm>
+          <a:prstGeom prst="downArrow">
+            <a:avLst/>
+          </a:prstGeom>
+          <a:solidFill>
+            <a:schemeClr val="accent6"/>
+          </a:solidFill>
+          <a:ln>
+            <a:solidFill>
+              <a:schemeClr val="accent6"/>
+            </a:solidFill>
+          </a:ln>
+          <a:effectLst>
+            <a:outerShdw blurRad="50800" dist="38100" dir="13500000" algn="br" rotWithShape="0">
+              <a:prstClr val="black">
+                <a:alpha val="40000"/>
+              </a:prstClr>
+            </a:outerShdw>
+          </a:effectLst>
+        </p:spPr>
+        <p:style>
+          <a:lnRef idx="2">
+            <a:schemeClr val="accent1">
+              <a:shade val="15000"/>
+            </a:schemeClr>
+          </a:lnRef>
+          <a:fillRef idx="1">
+            <a:schemeClr val="accent1"/>
+          </a:fillRef>
+          <a:effectRef idx="0">
+            <a:schemeClr val="accent1"/>
+          </a:effectRef>
+          <a:fontRef idx="minor">
+            <a:schemeClr val="lt1"/>
+          </a:fontRef>
+        </p:style>
+        <p:txBody>
+          <a:bodyPr rtlCol="0" anchor="ctr"/>
+          <a:lstStyle/>
+          <a:p>
+            <a:pPr algn="ctr"/>
+            <a:endParaRPr lang="es-ES"/>
+          </a:p>
+        </p:txBody>
+      </p:sp>
+      <p:grpSp>
+        <p:nvGrpSpPr>
+          <p:cNvPr id="14" name="Grupo 13">
+            <a:extLst>
+              <a:ext uri="{FF2B5EF4-FFF2-40B4-BE49-F238E27FC236}">
+                <a16:creationId xmlns:a16="http://schemas.microsoft.com/office/drawing/2014/main" id="{FB976E88-79CA-46C9-9261-D27D2E2714E2}"/>
+              </a:ext>
+            </a:extLst>
+          </p:cNvPr>
+          <p:cNvGrpSpPr/>
+          <p:nvPr/>
+        </p:nvGrpSpPr>
+        <p:grpSpPr>
+          <a:xfrm>
+            <a:off x="-1222691" y="3267410"/>
+            <a:ext cx="929640" cy="1015663"/>
+            <a:chOff x="10058399" y="2474986"/>
+            <a:chExt cx="929640" cy="1015663"/>
+          </a:xfrm>
+        </p:grpSpPr>
+        <p:sp>
+          <p:nvSpPr>
+            <p:cNvPr id="12" name="Rectángulo 11">
+              <a:extLst>
+                <a:ext uri="{FF2B5EF4-FFF2-40B4-BE49-F238E27FC236}">
+                  <a16:creationId xmlns:a16="http://schemas.microsoft.com/office/drawing/2014/main" id="{8495760B-5530-7C83-36AF-96300697B565}"/>
+                </a:ext>
+              </a:extLst>
+            </p:cNvPr>
+            <p:cNvSpPr/>
+            <p:nvPr/>
+          </p:nvSpPr>
+          <p:spPr>
+            <a:xfrm>
+              <a:off x="10058399" y="2927931"/>
+              <a:ext cx="497841" cy="501069"/>
+            </a:xfrm>
+            <a:prstGeom prst="rect">
+              <a:avLst/>
+            </a:prstGeom>
+            <a:noFill/>
+            <a:ln w="76200">
+              <a:solidFill>
+                <a:schemeClr val="tx1"/>
+              </a:solidFill>
+            </a:ln>
+          </p:spPr>
+          <p:style>
+            <a:lnRef idx="2">
+              <a:schemeClr val="accent1">
+                <a:shade val="15000"/>
+              </a:schemeClr>
+            </a:lnRef>
+            <a:fillRef idx="1">
+              <a:schemeClr val="accent1"/>
+            </a:fillRef>
+            <a:effectRef idx="0">
+              <a:schemeClr val="accent1"/>
+            </a:effectRef>
+            <a:fontRef idx="minor">
+              <a:schemeClr val="lt1"/>
+            </a:fontRef>
+          </p:style>
+          <p:txBody>
+            <a:bodyPr rtlCol="0" anchor="ctr"/>
+            <a:lstStyle/>
+            <a:p>
+              <a:pPr algn="ctr"/>
+              <a:endParaRPr lang="es-ES"/>
+            </a:p>
+          </p:txBody>
+        </p:sp>
+        <p:sp>
+          <p:nvSpPr>
+            <p:cNvPr id="13" name="CuadroTexto 12">
+              <a:extLst>
+                <a:ext uri="{FF2B5EF4-FFF2-40B4-BE49-F238E27FC236}">
+                  <a16:creationId xmlns:a16="http://schemas.microsoft.com/office/drawing/2014/main" id="{679BFACD-03DB-A251-2BC7-0E20F5760E5A}"/>
+                </a:ext>
+              </a:extLst>
+            </p:cNvPr>
+            <p:cNvSpPr txBox="1"/>
+            <p:nvPr/>
+          </p:nvSpPr>
+          <p:spPr>
+            <a:xfrm>
+              <a:off x="10124439" y="2474986"/>
+              <a:ext cx="863600" cy="1015663"/>
+            </a:xfrm>
+            <a:prstGeom prst="rect">
+              <a:avLst/>
+            </a:prstGeom>
+            <a:noFill/>
+          </p:spPr>
+          <p:txBody>
+            <a:bodyPr wrap="square" rtlCol="0">
+              <a:spAutoFit/>
+            </a:bodyPr>
+            <a:lstStyle/>
+            <a:p>
+              <a:r>
+                <a:rPr lang="es-ES" sz="6000" dirty="0">
+                  <a:solidFill>
+                    <a:schemeClr val="accent6"/>
+                  </a:solidFill>
+                </a:rPr>
+                <a:t>✓</a:t>
+              </a:r>
+              <a:endParaRPr lang="es-ES" dirty="0">
+                <a:solidFill>
+                  <a:schemeClr val="accent6"/>
+                </a:solidFill>
+              </a:endParaRPr>
+            </a:p>
+          </p:txBody>
+        </p:sp>
+      </p:grpSp>
     </p:spTree>
     <p:extLst>
       <p:ext uri="{BB962C8B-B14F-4D97-AF65-F5344CB8AC3E}">
@@ -19862,6 +20741,206 @@
   <p:clrMapOvr>
     <a:masterClrMapping/>
   </p:clrMapOvr>
+  <p:timing>
+    <p:tnLst>
+      <p:par>
+        <p:cTn id="1" dur="indefinite" restart="never" nodeType="tmRoot">
+          <p:childTnLst>
+            <p:seq concurrent="1" nextAc="seek">
+              <p:cTn id="2" dur="indefinite" nodeType="mainSeq">
+                <p:childTnLst>
+                  <p:par>
+                    <p:cTn id="3" fill="hold">
+                      <p:stCondLst>
+                        <p:cond delay="indefinite"/>
+                        <p:cond evt="onBegin" delay="0">
+                          <p:tn val="2"/>
+                        </p:cond>
+                      </p:stCondLst>
+                      <p:childTnLst>
+                        <p:par>
+                          <p:cTn id="4" fill="hold">
+                            <p:stCondLst>
+                              <p:cond delay="0"/>
+                            </p:stCondLst>
+                            <p:childTnLst>
+                              <p:par>
+                                <p:cTn id="5" presetID="0" presetClass="path" presetSubtype="0" accel="50000" decel="50000" fill="hold" nodeType="withEffect">
+                                  <p:stCondLst>
+                                    <p:cond delay="0"/>
+                                  </p:stCondLst>
+                                  <p:childTnLst>
+                                    <p:animMotion origin="layout" path="M 0.00248 -0.00996 L 0.00248 -0.00996 C 0.00717 -0.02107 0.01237 -0.03149 0.01628 -0.04329 C 0.01875 -0.05093 0.01901 -0.06019 0.02136 -0.06783 C 0.02956 -0.09653 0.03685 -0.12639 0.04753 -0.15232 C 0.07279 -0.21343 0.07448 -0.2132 0.09375 -0.27454 C 0.10326 -0.3044 0.10092 -0.30811 0.1125 -0.3301 C 0.11563 -0.33588 0.1181 -0.34445 0.12253 -0.34561 C 0.14271 -0.3507 0.16342 -0.34699 0.18386 -0.34792 C 0.20105 -0.36065 0.22852 -0.38102 0.24362 -0.39445 C 0.25105 -0.40093 0.25782 -0.40926 0.26498 -0.41667 C 0.26706 -0.42408 0.26954 -0.43125 0.27123 -0.43889 C 0.27422 -0.45348 0.26967 -0.46737 0.27748 -0.48102 C 0.28373 -0.49237 0.29258 -0.49885 0.30118 -0.50324 C 0.31185 -0.5088 0.34441 -0.51112 0.35743 -0.51227 C 0.38464 -0.51968 0.40052 -0.52593 0.43373 -0.51227 C 0.44388 -0.50811 0.44961 -0.48519 0.4599 -0.48102 C 0.46368 -0.47963 0.46732 -0.47755 0.47123 -0.47662 C 0.4793 -0.475 0.51472 -0.47246 0.51875 -0.47223 C 0.54115 -0.47454 0.56381 -0.4757 0.5862 -0.47894 C 0.5892 -0.4794 0.59245 -0.48056 0.59493 -0.48334 C 0.59727 -0.48588 0.59818 -0.49098 0.6 -0.49445 C 0.60235 -0.49908 0.60521 -0.50301 0.60743 -0.50787 C 0.61381 -0.52107 0.62032 -0.53982 0.625 -0.55417 C 0.63008 -0.57014 0.62891 -0.57176 0.6349 -0.58542 C 0.63998 -0.5963 0.64271 -0.59676 0.65 -0.60533 C 0.65547 -0.61181 0.6612 -0.6176 0.66615 -0.62524 C 0.67227 -0.63473 0.68711 -0.6676 0.69115 -0.67871 C 0.69792 -0.69676 0.70482 -0.71459 0.7099 -0.73426 C 0.71784 -0.76412 0.71667 -0.76436 0.72618 -0.7875 C 0.72696 -0.78912 0.72787 -0.79051 0.72865 -0.7919 L 0.76003 -0.84098 " pathEditMode="relative" ptsTypes="AAAAAAAAAAAAAAAAAAAAAAAAAAAAAAAA">
+                                      <p:cBhvr>
+                                        <p:cTn id="6" dur="2000" fill="hold"/>
+                                        <p:tgtEl>
+                                          <p:spTgt spid="8"/>
+                                        </p:tgtEl>
+                                        <p:attrNameLst>
+                                          <p:attrName>ppt_x</p:attrName>
+                                          <p:attrName>ppt_y</p:attrName>
+                                        </p:attrNameLst>
+                                      </p:cBhvr>
+                                    </p:animMotion>
+                                  </p:childTnLst>
+                                </p:cTn>
+                              </p:par>
+                              <p:par>
+                                <p:cTn id="7" presetID="0" presetClass="path" presetSubtype="0" accel="50000" decel="50000" fill="hold" nodeType="withEffect">
+                                  <p:stCondLst>
+                                    <p:cond delay="0"/>
+                                  </p:stCondLst>
+                                  <p:childTnLst>
+                                    <p:animMotion origin="layout" path="M -0.01563 -0.00416 L -0.01563 -0.00416 C -0.01068 0.01158 -0.0043 0.02593 -0.00065 0.0426 C 0.00325 0.06111 0.00469 0.08102 0.00677 0.10047 C 0.01198 0.14584 0.01185 0.15463 0.01432 0.19792 C 0.01471 0.23565 0.01328 0.27385 0.01562 0.31135 C 0.01601 0.3176 0.02786 0.31991 0.0293 0.32014 C 0.05013 0.32292 0.07096 0.32454 0.09193 0.32685 C 0.09232 0.33056 0.0931 0.33426 0.0931 0.33797 C 0.0931 0.4007 0.0944 0.39885 0.08932 0.44028 C 0.08815 0.44977 0.08724 0.45949 0.08555 0.46898 C 0.08385 0.47963 0.08138 0.48982 0.0793 0.50023 C 0.07721 0.51204 0.07513 0.52385 0.07305 0.53565 C 0.07266 0.54306 0.07253 0.5507 0.07187 0.55787 C 0.07135 0.5632 0.06966 0.56806 0.0694 0.57361 C 0.06849 0.58681 0.06862 0.60023 0.0681 0.61343 C 0.06784 0.62084 0.06797 0.62848 0.0668 0.63565 C 0.06588 0.64213 0.06354 0.64769 0.06185 0.65348 C 0.06146 0.6588 0.06133 0.66412 0.06055 0.66898 C 0.05963 0.67523 0.05716 0.68056 0.0569 0.68681 C 0.05638 0.69584 0.05664 0.70486 0.05807 0.71343 C 0.06081 0.72963 0.0737 0.74792 0.0806 0.75348 C 0.09088 0.76204 0.10234 0.76528 0.11315 0.7713 C 0.11641 0.7757 0.11979 0.78033 0.12318 0.78473 C 0.12435 0.78611 0.12604 0.78704 0.12682 0.78912 C 0.12851 0.79306 0.12943 0.79792 0.1306 0.80232 C 0.13281 0.81042 0.13476 0.81875 0.13685 0.82685 C 0.13437 0.84676 0.13424 0.86829 0.12943 0.88681 C 0.12526 0.90255 0.11068 0.92685 0.11068 0.92685 C 0.11016 0.92986 0.1082 0.93357 0.10937 0.93565 C 0.11302 0.94283 0.11862 0.94584 0.12318 0.95139 C 0.12904 0.95857 0.13476 0.96621 0.14062 0.97361 C 0.14154 0.98102 0.14297 0.9882 0.1431 0.99584 C 0.14453 1.07431 0.14075 1.04723 0.1069 1.12917 C 0.10325 1.13773 0.09687 1.15579 0.09687 1.15579 C 0.09479 1.17477 0.09401 1.16621 0.1056 1.18681 C 0.13086 1.23172 0.10781 1.1882 0.13307 1.22685 C 0.13633 1.23172 0.13893 1.24329 0.14062 1.24908 C 0.14154 1.26459 0.14141 1.28033 0.1431 1.29584 C 0.14766 1.33565 0.14687 1.28334 0.14687 1.31135 L 0.1457 1.39144 " pathEditMode="relative" ptsTypes="AAAAAAAAAAAAAAAAAAAAAAAAAAAAAAAAAAAAAAAAA">
+                                      <p:cBhvr>
+                                        <p:cTn id="8" dur="2000" fill="hold"/>
+                                        <p:tgtEl>
+                                          <p:spTgt spid="9"/>
+                                        </p:tgtEl>
+                                        <p:attrNameLst>
+                                          <p:attrName>ppt_x</p:attrName>
+                                          <p:attrName>ppt_y</p:attrName>
+                                        </p:attrNameLst>
+                                      </p:cBhvr>
+                                    </p:animMotion>
+                                  </p:childTnLst>
+                                </p:cTn>
+                              </p:par>
+                              <p:par>
+                                <p:cTn id="9" presetID="0" presetClass="path" presetSubtype="0" accel="50000" decel="50000" fill="hold" nodeType="withEffect">
+                                  <p:stCondLst>
+                                    <p:cond delay="0"/>
+                                  </p:stCondLst>
+                                  <p:childTnLst>
+                                    <p:animMotion origin="layout" path="M 0.00065 0.00995 L 0.00065 0.00995 C -0.02604 0.01736 -0.05364 0.01759 -0.07943 0.03218 C -0.10078 0.04398 -0.12018 0.05116 -0.13945 0.06991 C -0.14336 0.07361 -0.14739 0.07778 -0.15065 0.0831 C -0.16172 0.10162 -0.16836 0.13009 -0.17318 0.1544 C -0.1806 0.19097 -0.18359 0.20301 -0.18815 0.24769 C -0.18906 0.25579 -0.18945 0.26412 -0.19062 0.27199 C -0.19284 0.28565 -0.19609 0.29861 -0.19818 0.31204 C -0.19974 0.32222 -0.19974 0.33333 -0.20195 0.34329 C -0.20443 0.3544 -0.20859 0.36389 -0.21198 0.37431 C -0.21549 0.40301 -0.21771 0.42708 -0.22448 0.4544 C -0.23164 0.4838 -0.23711 0.51551 -0.24818 0.54097 C -0.25104 0.54769 -0.25286 0.55671 -0.2569 0.56088 C -0.26133 0.56551 -0.26693 0.56389 -0.27187 0.56551 C -0.27448 0.56829 -0.27734 0.57037 -0.27943 0.57431 C -0.28776 0.59051 -0.28698 0.60324 -0.28945 0.62546 C -0.28984 0.64028 -0.29023 0.65509 -0.29062 0.66991 C -0.29297 0.74213 -0.28893 0.8081 -0.30443 0.87431 C -0.30677 0.88426 -0.31029 0.89306 -0.31445 0.90093 C -0.34271 0.95486 -0.33346 0.92755 -0.36315 0.96991 C -0.37031 0.98009 -0.37669 0.99167 -0.3832 1.00324 C -0.38502 1.00648 -0.38646 1.01065 -0.38815 1.01435 L -0.39323 1.02546 L -0.42812 1.09884 " pathEditMode="relative" ptsTypes="AAAAAAAAAAAAAAAAAAAAAAAAA">
+                                      <p:cBhvr>
+                                        <p:cTn id="10" dur="2000" fill="hold"/>
+                                        <p:tgtEl>
+                                          <p:spTgt spid="10"/>
+                                        </p:tgtEl>
+                                        <p:attrNameLst>
+                                          <p:attrName>ppt_x</p:attrName>
+                                          <p:attrName>ppt_y</p:attrName>
+                                        </p:attrNameLst>
+                                      </p:cBhvr>
+                                    </p:animMotion>
+                                  </p:childTnLst>
+                                </p:cTn>
+                              </p:par>
+                              <p:par>
+                                <p:cTn id="11" presetID="0" presetClass="path" presetSubtype="0" accel="50000" decel="50000" fill="hold" nodeType="withEffect">
+                                  <p:stCondLst>
+                                    <p:cond delay="0"/>
+                                  </p:stCondLst>
+                                  <p:childTnLst>
+                                    <p:animMotion origin="layout" path="M 0.01862 -0.0088 L -0.2388 -0.26899 L -0.32018 -0.39769 L -0.33008 -0.53565 L -0.38633 -0.56436 L -0.43502 -0.67338 L -0.48633 -0.70209 " pathEditMode="relative" ptsTypes="AAAAAAA">
+                                      <p:cBhvr>
+                                        <p:cTn id="12" dur="2000" fill="hold"/>
+                                        <p:tgtEl>
+                                          <p:spTgt spid="7"/>
+                                        </p:tgtEl>
+                                        <p:attrNameLst>
+                                          <p:attrName>ppt_x</p:attrName>
+                                          <p:attrName>ppt_y</p:attrName>
+                                        </p:attrNameLst>
+                                      </p:cBhvr>
+                                    </p:animMotion>
+                                  </p:childTnLst>
+                                </p:cTn>
+                              </p:par>
+                            </p:childTnLst>
+                          </p:cTn>
+                        </p:par>
+                        <p:par>
+                          <p:cTn id="13" fill="hold">
+                            <p:stCondLst>
+                              <p:cond delay="2000"/>
+                            </p:stCondLst>
+                            <p:childTnLst>
+                              <p:par>
+                                <p:cTn id="14" presetID="42" presetClass="path" presetSubtype="0" accel="50000" decel="50000" fill="hold" grpId="0" nodeType="afterEffect">
+                                  <p:stCondLst>
+                                    <p:cond delay="0"/>
+                                  </p:stCondLst>
+                                  <p:childTnLst>
+                                    <p:animMotion origin="layout" path="M -1.875E-6 -4.81481E-6 L 0.00508 1.28426 " pathEditMode="relative" rAng="0" ptsTypes="AA">
+                                      <p:cBhvr>
+                                        <p:cTn id="15" dur="2000" fill="hold"/>
+                                        <p:tgtEl>
+                                          <p:spTgt spid="11"/>
+                                        </p:tgtEl>
+                                        <p:attrNameLst>
+                                          <p:attrName>ppt_x</p:attrName>
+                                          <p:attrName>ppt_y</p:attrName>
+                                        </p:attrNameLst>
+                                      </p:cBhvr>
+                                      <p:rCtr x="247" y="64213"/>
+                                    </p:animMotion>
+                                  </p:childTnLst>
+                                </p:cTn>
+                              </p:par>
+                            </p:childTnLst>
+                          </p:cTn>
+                        </p:par>
+                        <p:par>
+                          <p:cTn id="16" fill="hold">
+                            <p:stCondLst>
+                              <p:cond delay="4000"/>
+                            </p:stCondLst>
+                            <p:childTnLst>
+                              <p:par>
+                                <p:cTn id="17" presetID="42" presetClass="path" presetSubtype="0" accel="50000" decel="50000" fill="hold" nodeType="afterEffect">
+                                  <p:stCondLst>
+                                    <p:cond delay="0"/>
+                                  </p:stCondLst>
+                                  <p:childTnLst>
+                                    <p:animMotion origin="layout" path="M -6.25E-7 -2.96296E-6 L 0.62461 0.51181 " pathEditMode="relative" rAng="0" ptsTypes="AA">
+                                      <p:cBhvr>
+                                        <p:cTn id="18" dur="2000" fill="hold"/>
+                                        <p:tgtEl>
+                                          <p:spTgt spid="14"/>
+                                        </p:tgtEl>
+                                        <p:attrNameLst>
+                                          <p:attrName>ppt_x</p:attrName>
+                                          <p:attrName>ppt_y</p:attrName>
+                                        </p:attrNameLst>
+                                      </p:cBhvr>
+                                      <p:rCtr x="31224" y="25579"/>
+                                    </p:animMotion>
+                                  </p:childTnLst>
+                                </p:cTn>
+                              </p:par>
+                            </p:childTnLst>
+                          </p:cTn>
+                        </p:par>
+                      </p:childTnLst>
+                    </p:cTn>
+                  </p:par>
+                </p:childTnLst>
+              </p:cTn>
+              <p:prevCondLst>
+                <p:cond evt="onPrev" delay="0">
+                  <p:tgtEl>
+                    <p:sldTgt/>
+                  </p:tgtEl>
+                </p:cond>
+              </p:prevCondLst>
+              <p:nextCondLst>
+                <p:cond evt="onNext" delay="0">
+                  <p:tgtEl>
+                    <p:sldTgt/>
+                  </p:tgtEl>
+                </p:cond>
+              </p:nextCondLst>
+            </p:seq>
+          </p:childTnLst>
+        </p:cTn>
+      </p:par>
+    </p:tnLst>
+    <p:bldLst>
+      <p:bldP spid="11" grpId="0" animBg="1"/>
+    </p:bldLst>
+  </p:timing>
 </p:sld>
 </file>
 
@@ -22840,6 +23919,226 @@
           </p:txBody>
         </p:sp>
       </p:grpSp>
+      <p:sp>
+        <p:nvSpPr>
+          <p:cNvPr id="2" name="Rectángulo 1">
+            <a:extLst>
+              <a:ext uri="{FF2B5EF4-FFF2-40B4-BE49-F238E27FC236}">
+                <a16:creationId xmlns:a16="http://schemas.microsoft.com/office/drawing/2014/main" id="{234B16A7-DFEB-ABAB-4B55-031E74ECAB42}"/>
+              </a:ext>
+            </a:extLst>
+          </p:cNvPr>
+          <p:cNvSpPr/>
+          <p:nvPr/>
+        </p:nvSpPr>
+        <p:spPr>
+          <a:xfrm rot="9052849">
+            <a:off x="8973427" y="1637700"/>
+            <a:ext cx="505267" cy="923330"/>
+          </a:xfrm>
+          <a:prstGeom prst="rect">
+            <a:avLst/>
+          </a:prstGeom>
+          <a:noFill/>
+        </p:spPr>
+        <p:txBody>
+          <a:bodyPr wrap="none" lIns="91440" tIns="45720" rIns="91440" bIns="45720">
+            <a:spAutoFit/>
+          </a:bodyPr>
+          <a:lstStyle/>
+          <a:p>
+            <a:pPr algn="ctr"/>
+            <a:r>
+              <a:rPr lang="es-ES" sz="5400" b="1" cap="none" spc="0" dirty="0">
+                <a:ln w="12700">
+                  <a:solidFill>
+                    <a:schemeClr val="accent5"/>
+                  </a:solidFill>
+                  <a:prstDash val="solid"/>
+                </a:ln>
+                <a:pattFill prst="ltDnDiag">
+                  <a:fgClr>
+                    <a:schemeClr val="accent5">
+                      <a:lumMod val="60000"/>
+                      <a:lumOff val="40000"/>
+                    </a:schemeClr>
+                  </a:fgClr>
+                  <a:bgClr>
+                    <a:schemeClr val="bg1"/>
+                  </a:bgClr>
+                </a:pattFill>
+                <a:effectLst/>
+              </a:rPr>
+              <a:t>¿</a:t>
+            </a:r>
+          </a:p>
+        </p:txBody>
+      </p:sp>
+      <p:sp>
+        <p:nvSpPr>
+          <p:cNvPr id="3" name="Rectángulo 2">
+            <a:extLst>
+              <a:ext uri="{FF2B5EF4-FFF2-40B4-BE49-F238E27FC236}">
+                <a16:creationId xmlns:a16="http://schemas.microsoft.com/office/drawing/2014/main" id="{5911DCFE-AF8C-56E2-DB27-33A5B0F7C2A0}"/>
+              </a:ext>
+            </a:extLst>
+          </p:cNvPr>
+          <p:cNvSpPr/>
+          <p:nvPr/>
+        </p:nvSpPr>
+        <p:spPr>
+          <a:xfrm rot="11293922">
+            <a:off x="10418296" y="3249657"/>
+            <a:ext cx="505267" cy="923330"/>
+          </a:xfrm>
+          <a:prstGeom prst="rect">
+            <a:avLst/>
+          </a:prstGeom>
+          <a:noFill/>
+        </p:spPr>
+        <p:txBody>
+          <a:bodyPr wrap="none" lIns="91440" tIns="45720" rIns="91440" bIns="45720">
+            <a:spAutoFit/>
+          </a:bodyPr>
+          <a:lstStyle/>
+          <a:p>
+            <a:pPr algn="ctr"/>
+            <a:r>
+              <a:rPr lang="es-ES" sz="5400" b="1" cap="none" spc="0" dirty="0">
+                <a:ln w="12700">
+                  <a:solidFill>
+                    <a:schemeClr val="accent5"/>
+                  </a:solidFill>
+                  <a:prstDash val="solid"/>
+                </a:ln>
+                <a:pattFill prst="ltDnDiag">
+                  <a:fgClr>
+                    <a:schemeClr val="accent5">
+                      <a:lumMod val="60000"/>
+                      <a:lumOff val="40000"/>
+                    </a:schemeClr>
+                  </a:fgClr>
+                  <a:bgClr>
+                    <a:schemeClr val="bg1"/>
+                  </a:bgClr>
+                </a:pattFill>
+                <a:effectLst/>
+              </a:rPr>
+              <a:t>¿</a:t>
+            </a:r>
+          </a:p>
+        </p:txBody>
+      </p:sp>
+      <p:sp>
+        <p:nvSpPr>
+          <p:cNvPr id="11" name="Rectángulo 10">
+            <a:extLst>
+              <a:ext uri="{FF2B5EF4-FFF2-40B4-BE49-F238E27FC236}">
+                <a16:creationId xmlns:a16="http://schemas.microsoft.com/office/drawing/2014/main" id="{564EB2D4-03C5-CFAB-E92D-5A6CBEA072B5}"/>
+              </a:ext>
+            </a:extLst>
+          </p:cNvPr>
+          <p:cNvSpPr/>
+          <p:nvPr/>
+        </p:nvSpPr>
+        <p:spPr>
+          <a:xfrm rot="18163939">
+            <a:off x="2174042" y="4094773"/>
+            <a:ext cx="505267" cy="923330"/>
+          </a:xfrm>
+          <a:prstGeom prst="rect">
+            <a:avLst/>
+          </a:prstGeom>
+          <a:noFill/>
+        </p:spPr>
+        <p:txBody>
+          <a:bodyPr wrap="none" lIns="91440" tIns="45720" rIns="91440" bIns="45720">
+            <a:spAutoFit/>
+          </a:bodyPr>
+          <a:lstStyle/>
+          <a:p>
+            <a:pPr algn="ctr"/>
+            <a:r>
+              <a:rPr lang="es-ES" sz="5400" b="1" cap="none" spc="0" dirty="0">
+                <a:ln w="12700">
+                  <a:solidFill>
+                    <a:schemeClr val="accent5"/>
+                  </a:solidFill>
+                  <a:prstDash val="solid"/>
+                </a:ln>
+                <a:pattFill prst="ltDnDiag">
+                  <a:fgClr>
+                    <a:schemeClr val="accent5">
+                      <a:lumMod val="60000"/>
+                      <a:lumOff val="40000"/>
+                    </a:schemeClr>
+                  </a:fgClr>
+                  <a:bgClr>
+                    <a:schemeClr val="bg1"/>
+                  </a:bgClr>
+                </a:pattFill>
+                <a:effectLst/>
+              </a:rPr>
+              <a:t>¿</a:t>
+            </a:r>
+          </a:p>
+        </p:txBody>
+      </p:sp>
+      <p:sp>
+        <p:nvSpPr>
+          <p:cNvPr id="12" name="Rectángulo 11">
+            <a:extLst>
+              <a:ext uri="{FF2B5EF4-FFF2-40B4-BE49-F238E27FC236}">
+                <a16:creationId xmlns:a16="http://schemas.microsoft.com/office/drawing/2014/main" id="{2668CA0F-B387-0E15-CB1B-D04B3C9CF539}"/>
+              </a:ext>
+            </a:extLst>
+          </p:cNvPr>
+          <p:cNvSpPr/>
+          <p:nvPr/>
+        </p:nvSpPr>
+        <p:spPr>
+          <a:xfrm rot="1212159">
+            <a:off x="1306535" y="1637700"/>
+            <a:ext cx="505267" cy="923330"/>
+          </a:xfrm>
+          <a:prstGeom prst="rect">
+            <a:avLst/>
+          </a:prstGeom>
+          <a:noFill/>
+        </p:spPr>
+        <p:txBody>
+          <a:bodyPr wrap="none" lIns="91440" tIns="45720" rIns="91440" bIns="45720">
+            <a:spAutoFit/>
+          </a:bodyPr>
+          <a:lstStyle/>
+          <a:p>
+            <a:pPr algn="ctr"/>
+            <a:r>
+              <a:rPr lang="es-ES" sz="5400" b="1" cap="none" spc="0" dirty="0">
+                <a:ln w="12700">
+                  <a:solidFill>
+                    <a:schemeClr val="accent5"/>
+                  </a:solidFill>
+                  <a:prstDash val="solid"/>
+                </a:ln>
+                <a:pattFill prst="ltDnDiag">
+                  <a:fgClr>
+                    <a:schemeClr val="accent5">
+                      <a:lumMod val="60000"/>
+                      <a:lumOff val="40000"/>
+                    </a:schemeClr>
+                  </a:fgClr>
+                  <a:bgClr>
+                    <a:schemeClr val="bg1"/>
+                  </a:bgClr>
+                </a:pattFill>
+                <a:effectLst/>
+              </a:rPr>
+              <a:t>¿</a:t>
+            </a:r>
+          </a:p>
+        </p:txBody>
+      </p:sp>
     </p:spTree>
     <p:extLst>
       <p:ext uri="{BB962C8B-B14F-4D97-AF65-F5344CB8AC3E}">
@@ -25467,7 +26766,7 @@
         </p:nvSpPr>
         <p:spPr>
           <a:xfrm>
-            <a:off x="0" y="2766218"/>
+            <a:off x="-3310128" y="2482813"/>
             <a:ext cx="12192000" cy="1325563"/>
           </a:xfrm>
           <a:prstGeom prst="rect">
@@ -25500,7 +26799,7 @@
           <a:p>
             <a:pPr algn="ctr"/>
             <a:r>
-              <a:rPr lang="es-ES" sz="11500" b="1" dirty="0">
+              <a:rPr lang="es-ES" sz="28700" b="1" dirty="0">
                 <a:ln w="12700">
                   <a:solidFill>
                     <a:schemeClr val="accent5"/>
@@ -26031,6 +27330,42 @@
           </p:txBody>
         </p:sp>
       </p:grpSp>
+      <p:pic>
+        <p:nvPicPr>
+          <p:cNvPr id="3" name="Imagen 2">
+            <a:extLst>
+              <a:ext uri="{FF2B5EF4-FFF2-40B4-BE49-F238E27FC236}">
+                <a16:creationId xmlns:a16="http://schemas.microsoft.com/office/drawing/2014/main" id="{8190538E-BE42-43BD-6007-A7FE57A93BD5}"/>
+              </a:ext>
+            </a:extLst>
+          </p:cNvPr>
+          <p:cNvPicPr>
+            <a:picLocks noChangeAspect="1"/>
+          </p:cNvPicPr>
+          <p:nvPr/>
+        </p:nvPicPr>
+        <p:blipFill>
+          <a:blip r:embed="rId3">
+            <a:extLst>
+              <a:ext uri="{28A0092B-C50C-407E-A947-70E740481C1C}">
+                <a14:useLocalDpi xmlns:a14="http://schemas.microsoft.com/office/drawing/2010/main" val="0"/>
+              </a:ext>
+            </a:extLst>
+          </a:blip>
+          <a:stretch>
+            <a:fillRect/>
+          </a:stretch>
+        </p:blipFill>
+        <p:spPr>
+          <a:xfrm>
+            <a:off x="6161415" y="482454"/>
+            <a:ext cx="6858000" cy="6858000"/>
+          </a:xfrm>
+          <a:prstGeom prst="rect">
+            <a:avLst/>
+          </a:prstGeom>
+        </p:spPr>
+      </p:pic>
     </p:spTree>
     <p:extLst>
       <p:ext uri="{BB962C8B-B14F-4D97-AF65-F5344CB8AC3E}">
@@ -31993,13 +33328,13 @@
   <p:clrMapOvr>
     <a:masterClrMapping/>
   </p:clrMapOvr>
-  <mc:AlternateContent xmlns:mc="http://schemas.openxmlformats.org/markup-compatibility/2006">
-    <mc:Choice xmlns:p159="http://schemas.microsoft.com/office/powerpoint/2015/09/main" Requires="p159">
+  <mc:AlternateContent xmlns:mc="http://schemas.openxmlformats.org/markup-compatibility/2006" xmlns:p159="http://schemas.microsoft.com/office/powerpoint/2015/09/main">
+    <mc:Choice Requires="p159">
       <p:transition xmlns:p14="http://schemas.microsoft.com/office/powerpoint/2010/main" spd="slow" p14:dur="2000">
         <p159:morph option="byObject"/>
       </p:transition>
     </mc:Choice>
-    <mc:Fallback>
+    <mc:Fallback xmlns="">
       <p:transition spd="slow">
         <p:fade/>
       </p:transition>

</xml_diff>